<commit_message>
add additional week17 slide
</commit_message>
<xml_diff>
--- a/Weekly/17/17_Progress_Catchup.pptx
+++ b/Weekly/17/17_Progress_Catchup.pptx
@@ -13,7 +13,8 @@
     <p:sldId id="261" r:id="rId7"/>
     <p:sldId id="262" r:id="rId8"/>
     <p:sldId id="263" r:id="rId9"/>
-    <p:sldId id="264" r:id="rId10"/>
+    <p:sldId id="265" r:id="rId10"/>
+    <p:sldId id="264" r:id="rId11"/>
   </p:sldIdLst>
   <p:sldSz cx="12192000" cy="6858000"/>
   <p:notesSz cx="6858000" cy="9144000"/>
@@ -112,6 +113,11 @@
       </a:defRPr>
     </a:lvl9pPr>
   </p:defaultTextStyle>
+  <p:extLst>
+    <p:ext uri="{EFAFB233-063F-42B5-8137-9DF3F51BA10A}">
+      <p15:sldGuideLst xmlns:p15="http://schemas.microsoft.com/office/powerpoint/2012/main"/>
+    </p:ext>
+  </p:extLst>
 </p:presentation>
 </file>
 
@@ -3031,6 +3037,114 @@
 </p:sld>
 </file>
 
+<file path=ppt/slides/slide10.xml><?xml version="1.0" encoding="utf-8"?>
+<p:sld xmlns:a="http://schemas.openxmlformats.org/drawingml/2006/main" xmlns:r="http://schemas.openxmlformats.org/officeDocument/2006/relationships" xmlns:p="http://schemas.openxmlformats.org/presentationml/2006/main">
+  <p:cSld>
+    <p:spTree>
+      <p:nvGrpSpPr>
+        <p:cNvPr id="1" name=""/>
+        <p:cNvGrpSpPr/>
+        <p:nvPr/>
+      </p:nvGrpSpPr>
+      <p:grpSpPr>
+        <a:xfrm>
+          <a:off x="0" y="0"/>
+          <a:ext cx="0" cy="0"/>
+          <a:chOff x="0" y="0"/>
+          <a:chExt cx="0" cy="0"/>
+        </a:xfrm>
+      </p:grpSpPr>
+      <p:sp>
+        <p:nvSpPr>
+          <p:cNvPr id="2" name="Title 1"/>
+          <p:cNvSpPr>
+            <a:spLocks noGrp="1"/>
+          </p:cNvSpPr>
+          <p:nvPr>
+            <p:ph type="title"/>
+          </p:nvPr>
+        </p:nvSpPr>
+        <p:spPr/>
+        <p:txBody>
+          <a:bodyPr/>
+          <a:lstStyle/>
+          <a:p>
+            <a:r>
+              <a:rPr lang="en-GB" dirty="0" smtClean="0"/>
+              <a:t>Next week:</a:t>
+            </a:r>
+            <a:endParaRPr lang="en-GB" dirty="0"/>
+          </a:p>
+        </p:txBody>
+      </p:sp>
+      <p:sp>
+        <p:nvSpPr>
+          <p:cNvPr id="3" name="Content Placeholder 2"/>
+          <p:cNvSpPr>
+            <a:spLocks noGrp="1"/>
+          </p:cNvSpPr>
+          <p:nvPr>
+            <p:ph idx="1"/>
+          </p:nvPr>
+        </p:nvSpPr>
+        <p:spPr/>
+        <p:txBody>
+          <a:bodyPr/>
+          <a:lstStyle/>
+          <a:p>
+            <a:r>
+              <a:rPr lang="en-GB" dirty="0" smtClean="0"/>
+              <a:t>Get hypothesis and research questions refined and documented</a:t>
+            </a:r>
+          </a:p>
+          <a:p>
+            <a:r>
+              <a:rPr lang="en-GB" dirty="0" smtClean="0"/>
+              <a:t>Start building the thesis document itself</a:t>
+            </a:r>
+          </a:p>
+          <a:p>
+            <a:r>
+              <a:rPr lang="en-GB" dirty="0" smtClean="0"/>
+              <a:t>Find at least two more relevant papers, start going through reading backlog</a:t>
+            </a:r>
+          </a:p>
+          <a:p>
+            <a:r>
+              <a:rPr lang="en-GB" dirty="0" smtClean="0"/>
+              <a:t>Bracket off a sprint for </a:t>
+            </a:r>
+            <a:r>
+              <a:rPr lang="en-GB" i="1" dirty="0" smtClean="0"/>
+              <a:t>only</a:t>
+            </a:r>
+            <a:r>
+              <a:rPr lang="en-GB" dirty="0" smtClean="0"/>
+              <a:t> thesis work</a:t>
+            </a:r>
+          </a:p>
+          <a:p>
+            <a:r>
+              <a:rPr lang="en-GB" dirty="0" smtClean="0"/>
+              <a:t>Start on framework for simulating incoming data</a:t>
+            </a:r>
+            <a:endParaRPr lang="en-GB" dirty="0"/>
+          </a:p>
+        </p:txBody>
+      </p:sp>
+    </p:spTree>
+    <p:extLst>
+      <p:ext uri="{BB962C8B-B14F-4D97-AF65-F5344CB8AC3E}">
+        <p14:creationId xmlns:p14="http://schemas.microsoft.com/office/powerpoint/2010/main" val="2120629458"/>
+      </p:ext>
+    </p:extLst>
+  </p:cSld>
+  <p:clrMapOvr>
+    <a:masterClrMapping/>
+  </p:clrMapOvr>
+</p:sld>
+</file>
+
 <file path=ppt/slides/slide2.xml><?xml version="1.0" encoding="utf-8"?>
 <p:sld xmlns:a="http://schemas.openxmlformats.org/drawingml/2006/main" xmlns:r="http://schemas.openxmlformats.org/officeDocument/2006/relationships" xmlns:p="http://schemas.openxmlformats.org/presentationml/2006/main">
   <p:cSld>
@@ -4311,7 +4425,7 @@
           <a:p>
             <a:r>
               <a:rPr lang="en-GB" dirty="0" smtClean="0"/>
-              <a:t>Next week:</a:t>
+              <a:t>Short term goals</a:t>
             </a:r>
             <a:endParaRPr lang="en-GB" dirty="0"/>
           </a:p>
@@ -4333,41 +4447,54 @@
           <a:lstStyle/>
           <a:p>
             <a:r>
-              <a:rPr lang="en-GB" dirty="0" smtClean="0"/>
-              <a:t>Get hypothesis and research questions refined and documented</a:t>
-            </a:r>
-          </a:p>
-          <a:p>
-            <a:r>
-              <a:rPr lang="en-GB" dirty="0" smtClean="0"/>
-              <a:t>Start building the thesis document itself</a:t>
-            </a:r>
-          </a:p>
-          <a:p>
-            <a:r>
-              <a:rPr lang="en-GB" dirty="0" smtClean="0"/>
-              <a:t>Find at least two more relevant papers, start going through reading backlog</a:t>
-            </a:r>
-          </a:p>
-          <a:p>
-            <a:r>
-              <a:rPr lang="en-GB" dirty="0" smtClean="0"/>
-              <a:t>Bracket off a sprint for </a:t>
-            </a:r>
-            <a:r>
-              <a:rPr lang="en-GB" i="1" dirty="0" smtClean="0"/>
-              <a:t>only</a:t>
-            </a:r>
-            <a:r>
-              <a:rPr lang="en-GB" dirty="0" smtClean="0"/>
-              <a:t> thesis work</a:t>
-            </a:r>
-          </a:p>
-          <a:p>
-            <a:r>
-              <a:rPr lang="en-GB" dirty="0" smtClean="0"/>
-              <a:t>Start on framework for simulating incoming data</a:t>
-            </a:r>
+              <a:rPr lang="en-GB" dirty="0" err="1" smtClean="0"/>
+              <a:t>Buzzcapture</a:t>
+            </a:r>
+            <a:r>
+              <a:rPr lang="en-GB" dirty="0" smtClean="0"/>
+              <a:t> recently </a:t>
+            </a:r>
+            <a:r>
+              <a:rPr lang="en-GB" dirty="0" err="1" smtClean="0"/>
+              <a:t>accquired</a:t>
+            </a:r>
+            <a:r>
+              <a:rPr lang="en-GB" dirty="0" smtClean="0"/>
+              <a:t> by Obi4Wan</a:t>
+            </a:r>
+          </a:p>
+          <a:p>
+            <a:pPr lvl="1"/>
+            <a:r>
+              <a:rPr lang="en-GB" dirty="0" smtClean="0"/>
+              <a:t>Moving to combined </a:t>
+            </a:r>
+            <a:r>
+              <a:rPr lang="en-GB" dirty="0" err="1" smtClean="0"/>
+              <a:t>Zandaam</a:t>
+            </a:r>
+            <a:r>
+              <a:rPr lang="en-GB" dirty="0" smtClean="0"/>
+              <a:t> office 1st July</a:t>
+            </a:r>
+          </a:p>
+          <a:p>
+            <a:pPr lvl="1"/>
+            <a:r>
+              <a:rPr lang="en-GB" dirty="0" smtClean="0"/>
+              <a:t>Analytics team has some experience with change detection techniques</a:t>
+            </a:r>
+          </a:p>
+          <a:p>
+            <a:pPr lvl="1"/>
+            <a:r>
+              <a:rPr lang="en-GB" smtClean="0"/>
+              <a:t>Will leverage that knowledge for thesis project</a:t>
+            </a:r>
+            <a:endParaRPr lang="en-GB" dirty="0" smtClean="0"/>
+          </a:p>
+          <a:p>
+            <a:pPr lvl="1"/>
             <a:endParaRPr lang="en-GB" dirty="0"/>
           </a:p>
         </p:txBody>
@@ -4375,7 +4502,7 @@
     </p:spTree>
     <p:extLst>
       <p:ext uri="{BB962C8B-B14F-4D97-AF65-F5344CB8AC3E}">
-        <p14:creationId xmlns:p14="http://schemas.microsoft.com/office/powerpoint/2010/main" val="2120629458"/>
+        <p14:creationId xmlns:p14="http://schemas.microsoft.com/office/powerpoint/2010/main" val="580325560"/>
       </p:ext>
     </p:extLst>
   </p:cSld>

</xml_diff>